<commit_message>
Fix for py_lec_9: event is_set() == False initially
</commit_message>
<xml_diff>
--- a/Lectures/py_lec_10.pptx
+++ b/Lectures/py_lec_10.pptx
@@ -217,7 +217,7 @@
           <a:p>
             <a:fld id="{FF08647B-1F9F-41A4-B867-46FC175D451E}" type="datetimeFigureOut">
               <a:rPr lang="ru-RU" smtClean="0"/>
-              <a:t>10.10.2021</a:t>
+              <a:t>29.10.2021</a:t>
             </a:fld>
             <a:endParaRPr lang="ru-RU"/>
           </a:p>
@@ -22175,27 +22175,10 @@
                 <a:ea typeface="+mn-ea"/>
                 <a:cs typeface="+mn-cs"/>
               </a:rPr>
-              <a:t> </a:t>
-            </a:r>
-            <a:r>
-              <a:rPr kumimoji="0" lang="en-US" sz="1400" b="0" i="0" u="none" strike="noStrike" kern="1200" cap="none" spc="0" normalizeH="0" baseline="0" noProof="0" dirty="0" err="1">
-                <a:ln>
-                  <a:noFill/>
-                </a:ln>
-                <a:solidFill>
-                  <a:srgbClr val="000000"/>
-                </a:solidFill>
-                <a:effectLst/>
-                <a:uLnTx/>
-                <a:uFillTx/>
-                <a:latin typeface="Courier New" panose="02070309020205020404" pitchFamily="49" charset="0"/>
-                <a:ea typeface="+mn-ea"/>
-                <a:cs typeface="+mn-cs"/>
-              </a:rPr>
-              <a:t>self</a:t>
-            </a:r>
-            <a:r>
-              <a:rPr kumimoji="0" lang="en-US" sz="1400" b="1" i="0" u="none" strike="noStrike" kern="1200" cap="none" spc="0" normalizeH="0" baseline="0" noProof="0" dirty="0" err="1">
+              <a:t> self</a:t>
+            </a:r>
+            <a:r>
+              <a:rPr kumimoji="0" lang="en-US" sz="1400" b="1" i="0" u="none" strike="noStrike" kern="1200" cap="none" spc="0" normalizeH="0" baseline="0" noProof="0" dirty="0">
                 <a:ln>
                   <a:noFill/>
                 </a:ln>
@@ -22212,7 +22195,7 @@
               <a:t>.</a:t>
             </a:r>
             <a:r>
-              <a:rPr kumimoji="0" lang="en-US" sz="1400" b="0" i="0" u="none" strike="noStrike" kern="1200" cap="none" spc="0" normalizeH="0" baseline="0" noProof="0" dirty="0" err="1">
+              <a:rPr kumimoji="0" lang="en-US" sz="1400" b="0" i="0" u="none" strike="noStrike" kern="1200" cap="none" spc="0" normalizeH="0" baseline="0" noProof="0" dirty="0">
                 <a:ln>
                   <a:noFill/>
                 </a:ln>
@@ -22229,7 +22212,7 @@
               <a:t>_socket</a:t>
             </a:r>
             <a:r>
-              <a:rPr kumimoji="0" lang="en-US" sz="1400" b="1" i="0" u="none" strike="noStrike" kern="1200" cap="none" spc="0" normalizeH="0" baseline="0" noProof="0" dirty="0" err="1">
+              <a:rPr kumimoji="0" lang="en-US" sz="1400" b="1" i="0" u="none" strike="noStrike" kern="1200" cap="none" spc="0" normalizeH="0" baseline="0" noProof="0" dirty="0">
                 <a:ln>
                   <a:noFill/>
                 </a:ln>
@@ -22246,7 +22229,7 @@
               <a:t>.</a:t>
             </a:r>
             <a:r>
-              <a:rPr kumimoji="0" lang="en-US" sz="1400" b="0" i="0" u="none" strike="noStrike" kern="1200" cap="none" spc="0" normalizeH="0" baseline="0" noProof="0" dirty="0" err="1">
+              <a:rPr kumimoji="0" lang="en-US" sz="1400" b="0" i="0" u="none" strike="noStrike" kern="1200" cap="none" spc="0" normalizeH="0" baseline="0" noProof="0" dirty="0">
                 <a:ln>
                   <a:noFill/>
                 </a:ln>

</xml_diff>